<commit_message>
ajout fonctionnaité repondre à un sondage
</commit_message>
<xml_diff>
--- a/Documents/base de données.pptx
+++ b/Documents/base de données.pptx
@@ -260,7 +260,7 @@
           <a:p>
             <a:fld id="{A9D8FF9A-B495-4C1D-BB5F-1FB9EE86129C}" type="datetimeFigureOut">
               <a:rPr lang="fr-FR" smtClean="0"/>
-              <a:t>20/03/2020</a:t>
+              <a:t>24/03/2020</a:t>
             </a:fld>
             <a:endParaRPr lang="fr-FR"/>
           </a:p>
@@ -458,7 +458,7 @@
           <a:p>
             <a:fld id="{A9D8FF9A-B495-4C1D-BB5F-1FB9EE86129C}" type="datetimeFigureOut">
               <a:rPr lang="fr-FR" smtClean="0"/>
-              <a:t>20/03/2020</a:t>
+              <a:t>24/03/2020</a:t>
             </a:fld>
             <a:endParaRPr lang="fr-FR"/>
           </a:p>
@@ -666,7 +666,7 @@
           <a:p>
             <a:fld id="{A9D8FF9A-B495-4C1D-BB5F-1FB9EE86129C}" type="datetimeFigureOut">
               <a:rPr lang="fr-FR" smtClean="0"/>
-              <a:t>20/03/2020</a:t>
+              <a:t>24/03/2020</a:t>
             </a:fld>
             <a:endParaRPr lang="fr-FR"/>
           </a:p>
@@ -864,7 +864,7 @@
           <a:p>
             <a:fld id="{A9D8FF9A-B495-4C1D-BB5F-1FB9EE86129C}" type="datetimeFigureOut">
               <a:rPr lang="fr-FR" smtClean="0"/>
-              <a:t>20/03/2020</a:t>
+              <a:t>24/03/2020</a:t>
             </a:fld>
             <a:endParaRPr lang="fr-FR"/>
           </a:p>
@@ -1139,7 +1139,7 @@
           <a:p>
             <a:fld id="{A9D8FF9A-B495-4C1D-BB5F-1FB9EE86129C}" type="datetimeFigureOut">
               <a:rPr lang="fr-FR" smtClean="0"/>
-              <a:t>20/03/2020</a:t>
+              <a:t>24/03/2020</a:t>
             </a:fld>
             <a:endParaRPr lang="fr-FR"/>
           </a:p>
@@ -1404,7 +1404,7 @@
           <a:p>
             <a:fld id="{A9D8FF9A-B495-4C1D-BB5F-1FB9EE86129C}" type="datetimeFigureOut">
               <a:rPr lang="fr-FR" smtClean="0"/>
-              <a:t>20/03/2020</a:t>
+              <a:t>24/03/2020</a:t>
             </a:fld>
             <a:endParaRPr lang="fr-FR"/>
           </a:p>
@@ -1816,7 +1816,7 @@
           <a:p>
             <a:fld id="{A9D8FF9A-B495-4C1D-BB5F-1FB9EE86129C}" type="datetimeFigureOut">
               <a:rPr lang="fr-FR" smtClean="0"/>
-              <a:t>20/03/2020</a:t>
+              <a:t>24/03/2020</a:t>
             </a:fld>
             <a:endParaRPr lang="fr-FR"/>
           </a:p>
@@ -1957,7 +1957,7 @@
           <a:p>
             <a:fld id="{A9D8FF9A-B495-4C1D-BB5F-1FB9EE86129C}" type="datetimeFigureOut">
               <a:rPr lang="fr-FR" smtClean="0"/>
-              <a:t>20/03/2020</a:t>
+              <a:t>24/03/2020</a:t>
             </a:fld>
             <a:endParaRPr lang="fr-FR"/>
           </a:p>
@@ -2070,7 +2070,7 @@
           <a:p>
             <a:fld id="{A9D8FF9A-B495-4C1D-BB5F-1FB9EE86129C}" type="datetimeFigureOut">
               <a:rPr lang="fr-FR" smtClean="0"/>
-              <a:t>20/03/2020</a:t>
+              <a:t>24/03/2020</a:t>
             </a:fld>
             <a:endParaRPr lang="fr-FR"/>
           </a:p>
@@ -2381,7 +2381,7 @@
           <a:p>
             <a:fld id="{A9D8FF9A-B495-4C1D-BB5F-1FB9EE86129C}" type="datetimeFigureOut">
               <a:rPr lang="fr-FR" smtClean="0"/>
-              <a:t>20/03/2020</a:t>
+              <a:t>24/03/2020</a:t>
             </a:fld>
             <a:endParaRPr lang="fr-FR"/>
           </a:p>
@@ -2669,7 +2669,7 @@
           <a:p>
             <a:fld id="{A9D8FF9A-B495-4C1D-BB5F-1FB9EE86129C}" type="datetimeFigureOut">
               <a:rPr lang="fr-FR" smtClean="0"/>
-              <a:t>20/03/2020</a:t>
+              <a:t>24/03/2020</a:t>
             </a:fld>
             <a:endParaRPr lang="fr-FR"/>
           </a:p>
@@ -2910,7 +2910,7 @@
           <a:p>
             <a:fld id="{A9D8FF9A-B495-4C1D-BB5F-1FB9EE86129C}" type="datetimeFigureOut">
               <a:rPr lang="fr-FR" smtClean="0"/>
-              <a:t>20/03/2020</a:t>
+              <a:t>24/03/2020</a:t>
             </a:fld>
             <a:endParaRPr lang="fr-FR"/>
           </a:p>
@@ -4547,7 +4547,7 @@
         <p:spPr>
           <a:xfrm>
             <a:off x="6656537" y="1757670"/>
-            <a:ext cx="1527245" cy="923330"/>
+            <a:ext cx="1527245" cy="1200329"/>
           </a:xfrm>
           <a:prstGeom prst="rect">
             <a:avLst/>
@@ -4583,8 +4583,16 @@
             <a:pPr algn="ctr"/>
             <a:r>
               <a:rPr lang="fr-FR" dirty="0"/>
-              <a:t>statut</a:t>
-            </a:r>
+              <a:t>Statut</a:t>
+            </a:r>
+          </a:p>
+          <a:p>
+            <a:pPr algn="ctr"/>
+            <a:r>
+              <a:rPr lang="fr-FR" dirty="0" err="1"/>
+              <a:t>aVote</a:t>
+            </a:r>
+            <a:endParaRPr lang="fr-FR" dirty="0"/>
           </a:p>
         </p:txBody>
       </p:sp>
@@ -4866,8 +4874,8 @@
         </p:nvCxnSpPr>
         <p:spPr>
           <a:xfrm flipH="1" flipV="1">
-            <a:off x="7878397" y="2649665"/>
-            <a:ext cx="602408" cy="1134306"/>
+            <a:off x="7927408" y="2987780"/>
+            <a:ext cx="553397" cy="796191"/>
           </a:xfrm>
           <a:prstGeom prst="line">
             <a:avLst/>
@@ -4991,8 +4999,8 @@
         </p:nvCxnSpPr>
         <p:spPr>
           <a:xfrm flipV="1">
-            <a:off x="6625792" y="2681000"/>
-            <a:ext cx="377741" cy="1066885"/>
+            <a:off x="6625792" y="2957999"/>
+            <a:ext cx="291376" cy="789887"/>
           </a:xfrm>
           <a:prstGeom prst="line">
             <a:avLst/>
@@ -5148,7 +5156,7 @@
         </p:nvSpPr>
         <p:spPr>
           <a:xfrm>
-            <a:off x="7980298" y="2687834"/>
+            <a:off x="8123645" y="2946979"/>
             <a:ext cx="476412" cy="369332"/>
           </a:xfrm>
           <a:prstGeom prst="rect">
@@ -5254,7 +5262,7 @@
         </p:nvSpPr>
         <p:spPr>
           <a:xfrm>
-            <a:off x="6938780" y="2697491"/>
+            <a:off x="6847758" y="2972940"/>
             <a:ext cx="476412" cy="369332"/>
           </a:xfrm>
           <a:prstGeom prst="rect">

</xml_diff>

<commit_message>
ajout envoie de mail et suppression sondages dépassés
</commit_message>
<xml_diff>
--- a/Documents/base de données.pptx
+++ b/Documents/base de données.pptx
@@ -260,7 +260,7 @@
           <a:p>
             <a:fld id="{A9D8FF9A-B495-4C1D-BB5F-1FB9EE86129C}" type="datetimeFigureOut">
               <a:rPr lang="fr-FR" smtClean="0"/>
-              <a:t>24/03/2020</a:t>
+              <a:t>27/03/2020</a:t>
             </a:fld>
             <a:endParaRPr lang="fr-FR"/>
           </a:p>
@@ -458,7 +458,7 @@
           <a:p>
             <a:fld id="{A9D8FF9A-B495-4C1D-BB5F-1FB9EE86129C}" type="datetimeFigureOut">
               <a:rPr lang="fr-FR" smtClean="0"/>
-              <a:t>24/03/2020</a:t>
+              <a:t>27/03/2020</a:t>
             </a:fld>
             <a:endParaRPr lang="fr-FR"/>
           </a:p>
@@ -666,7 +666,7 @@
           <a:p>
             <a:fld id="{A9D8FF9A-B495-4C1D-BB5F-1FB9EE86129C}" type="datetimeFigureOut">
               <a:rPr lang="fr-FR" smtClean="0"/>
-              <a:t>24/03/2020</a:t>
+              <a:t>27/03/2020</a:t>
             </a:fld>
             <a:endParaRPr lang="fr-FR"/>
           </a:p>
@@ -864,7 +864,7 @@
           <a:p>
             <a:fld id="{A9D8FF9A-B495-4C1D-BB5F-1FB9EE86129C}" type="datetimeFigureOut">
               <a:rPr lang="fr-FR" smtClean="0"/>
-              <a:t>24/03/2020</a:t>
+              <a:t>27/03/2020</a:t>
             </a:fld>
             <a:endParaRPr lang="fr-FR"/>
           </a:p>
@@ -1139,7 +1139,7 @@
           <a:p>
             <a:fld id="{A9D8FF9A-B495-4C1D-BB5F-1FB9EE86129C}" type="datetimeFigureOut">
               <a:rPr lang="fr-FR" smtClean="0"/>
-              <a:t>24/03/2020</a:t>
+              <a:t>27/03/2020</a:t>
             </a:fld>
             <a:endParaRPr lang="fr-FR"/>
           </a:p>
@@ -1404,7 +1404,7 @@
           <a:p>
             <a:fld id="{A9D8FF9A-B495-4C1D-BB5F-1FB9EE86129C}" type="datetimeFigureOut">
               <a:rPr lang="fr-FR" smtClean="0"/>
-              <a:t>24/03/2020</a:t>
+              <a:t>27/03/2020</a:t>
             </a:fld>
             <a:endParaRPr lang="fr-FR"/>
           </a:p>
@@ -1816,7 +1816,7 @@
           <a:p>
             <a:fld id="{A9D8FF9A-B495-4C1D-BB5F-1FB9EE86129C}" type="datetimeFigureOut">
               <a:rPr lang="fr-FR" smtClean="0"/>
-              <a:t>24/03/2020</a:t>
+              <a:t>27/03/2020</a:t>
             </a:fld>
             <a:endParaRPr lang="fr-FR"/>
           </a:p>
@@ -1957,7 +1957,7 @@
           <a:p>
             <a:fld id="{A9D8FF9A-B495-4C1D-BB5F-1FB9EE86129C}" type="datetimeFigureOut">
               <a:rPr lang="fr-FR" smtClean="0"/>
-              <a:t>24/03/2020</a:t>
+              <a:t>27/03/2020</a:t>
             </a:fld>
             <a:endParaRPr lang="fr-FR"/>
           </a:p>
@@ -2070,7 +2070,7 @@
           <a:p>
             <a:fld id="{A9D8FF9A-B495-4C1D-BB5F-1FB9EE86129C}" type="datetimeFigureOut">
               <a:rPr lang="fr-FR" smtClean="0"/>
-              <a:t>24/03/2020</a:t>
+              <a:t>27/03/2020</a:t>
             </a:fld>
             <a:endParaRPr lang="fr-FR"/>
           </a:p>
@@ -2381,7 +2381,7 @@
           <a:p>
             <a:fld id="{A9D8FF9A-B495-4C1D-BB5F-1FB9EE86129C}" type="datetimeFigureOut">
               <a:rPr lang="fr-FR" smtClean="0"/>
-              <a:t>24/03/2020</a:t>
+              <a:t>27/03/2020</a:t>
             </a:fld>
             <a:endParaRPr lang="fr-FR"/>
           </a:p>
@@ -2669,7 +2669,7 @@
           <a:p>
             <a:fld id="{A9D8FF9A-B495-4C1D-BB5F-1FB9EE86129C}" type="datetimeFigureOut">
               <a:rPr lang="fr-FR" smtClean="0"/>
-              <a:t>24/03/2020</a:t>
+              <a:t>27/03/2020</a:t>
             </a:fld>
             <a:endParaRPr lang="fr-FR"/>
           </a:p>
@@ -2910,7 +2910,7 @@
           <a:p>
             <a:fld id="{A9D8FF9A-B495-4C1D-BB5F-1FB9EE86129C}" type="datetimeFigureOut">
               <a:rPr lang="fr-FR" smtClean="0"/>
-              <a:t>24/03/2020</a:t>
+              <a:t>27/03/2020</a:t>
             </a:fld>
             <a:endParaRPr lang="fr-FR"/>
           </a:p>
@@ -4547,7 +4547,7 @@
         <p:spPr>
           <a:xfrm>
             <a:off x="6656537" y="1757670"/>
-            <a:ext cx="1527245" cy="1200329"/>
+            <a:ext cx="1527245" cy="1754326"/>
           </a:xfrm>
           <a:prstGeom prst="rect">
             <a:avLst/>
@@ -4594,6 +4594,21 @@
             </a:r>
             <a:endParaRPr lang="fr-FR" dirty="0"/>
           </a:p>
+          <a:p>
+            <a:pPr algn="ctr"/>
+            <a:r>
+              <a:rPr lang="fr-FR" dirty="0"/>
+              <a:t>Participation</a:t>
+            </a:r>
+          </a:p>
+          <a:p>
+            <a:pPr algn="ctr"/>
+            <a:r>
+              <a:rPr lang="fr-FR" dirty="0" err="1"/>
+              <a:t>emailEnvoye</a:t>
+            </a:r>
+            <a:endParaRPr lang="fr-FR" dirty="0"/>
+          </a:p>
         </p:txBody>
       </p:sp>
       <p:sp>
@@ -4810,53 +4825,6 @@
           </a:fontRef>
         </p:style>
       </p:cxnSp>
-      <p:sp>
-        <p:nvSpPr>
-          <p:cNvPr id="87" name="Ellipse 86">
-            <a:extLst>
-              <a:ext uri="{FF2B5EF4-FFF2-40B4-BE49-F238E27FC236}">
-                <a16:creationId xmlns:a16="http://schemas.microsoft.com/office/drawing/2014/main" id="{F2BCCC1D-C1C3-44D9-90CE-183EAC1D3362}"/>
-              </a:ext>
-            </a:extLst>
-          </p:cNvPr>
-          <p:cNvSpPr/>
-          <p:nvPr/>
-        </p:nvSpPr>
-        <p:spPr>
-          <a:xfrm>
-            <a:off x="8274467" y="3675888"/>
-            <a:ext cx="1408961" cy="738037"/>
-          </a:xfrm>
-          <a:prstGeom prst="ellipse">
-            <a:avLst/>
-          </a:prstGeom>
-          <a:noFill/>
-        </p:spPr>
-        <p:style>
-          <a:lnRef idx="2">
-            <a:schemeClr val="accent1">
-              <a:shade val="50000"/>
-            </a:schemeClr>
-          </a:lnRef>
-          <a:fillRef idx="1">
-            <a:schemeClr val="accent1"/>
-          </a:fillRef>
-          <a:effectRef idx="0">
-            <a:schemeClr val="accent1"/>
-          </a:effectRef>
-          <a:fontRef idx="minor">
-            <a:schemeClr val="lt1"/>
-          </a:fontRef>
-        </p:style>
-        <p:txBody>
-          <a:bodyPr rtlCol="0" anchor="ctr"/>
-          <a:lstStyle/>
-          <a:p>
-            <a:pPr algn="ctr"/>
-            <a:endParaRPr lang="fr-FR"/>
-          </a:p>
-        </p:txBody>
-      </p:sp>
       <p:cxnSp>
         <p:nvCxnSpPr>
           <p:cNvPr id="88" name="Connecteur droit 87">
@@ -4874,8 +4842,8 @@
         </p:nvCxnSpPr>
         <p:spPr>
           <a:xfrm flipH="1" flipV="1">
-            <a:off x="7927408" y="2987780"/>
-            <a:ext cx="553397" cy="796191"/>
+            <a:off x="8115193" y="3511996"/>
+            <a:ext cx="297799" cy="1106961"/>
           </a:xfrm>
           <a:prstGeom prst="line">
             <a:avLst/>
@@ -4914,8 +4882,8 @@
         </p:nvCxnSpPr>
         <p:spPr>
           <a:xfrm flipV="1">
-            <a:off x="8978948" y="1228180"/>
-            <a:ext cx="1021460" cy="2447708"/>
+            <a:off x="8911135" y="1228180"/>
+            <a:ext cx="1089273" cy="3282694"/>
           </a:xfrm>
           <a:prstGeom prst="line">
             <a:avLst/>
@@ -4936,53 +4904,6 @@
           </a:fontRef>
         </p:style>
       </p:cxnSp>
-      <p:sp>
-        <p:nvSpPr>
-          <p:cNvPr id="101" name="Ellipse 100">
-            <a:extLst>
-              <a:ext uri="{FF2B5EF4-FFF2-40B4-BE49-F238E27FC236}">
-                <a16:creationId xmlns:a16="http://schemas.microsoft.com/office/drawing/2014/main" id="{3E7CDB0D-8FCD-4D3F-9C64-9B6823A6A582}"/>
-              </a:ext>
-            </a:extLst>
-          </p:cNvPr>
-          <p:cNvSpPr/>
-          <p:nvPr/>
-        </p:nvSpPr>
-        <p:spPr>
-          <a:xfrm>
-            <a:off x="5937223" y="3762827"/>
-            <a:ext cx="1408961" cy="738037"/>
-          </a:xfrm>
-          <a:prstGeom prst="ellipse">
-            <a:avLst/>
-          </a:prstGeom>
-          <a:noFill/>
-        </p:spPr>
-        <p:style>
-          <a:lnRef idx="2">
-            <a:schemeClr val="accent1">
-              <a:shade val="50000"/>
-            </a:schemeClr>
-          </a:lnRef>
-          <a:fillRef idx="1">
-            <a:schemeClr val="accent1"/>
-          </a:fillRef>
-          <a:effectRef idx="0">
-            <a:schemeClr val="accent1"/>
-          </a:effectRef>
-          <a:fontRef idx="minor">
-            <a:schemeClr val="lt1"/>
-          </a:fontRef>
-        </p:style>
-        <p:txBody>
-          <a:bodyPr rtlCol="0" anchor="ctr"/>
-          <a:lstStyle/>
-          <a:p>
-            <a:pPr algn="ctr"/>
-            <a:endParaRPr lang="fr-FR"/>
-          </a:p>
-        </p:txBody>
-      </p:sp>
       <p:cxnSp>
         <p:nvCxnSpPr>
           <p:cNvPr id="102" name="Connecteur droit 101">
@@ -4994,13 +4915,14 @@
           </p:cNvPr>
           <p:cNvCxnSpPr>
             <a:cxnSpLocks/>
+            <a:stCxn id="101" idx="0"/>
           </p:cNvCxnSpPr>
           <p:nvPr/>
         </p:nvCxnSpPr>
         <p:spPr>
           <a:xfrm flipV="1">
-            <a:off x="6625792" y="2957999"/>
-            <a:ext cx="291376" cy="789887"/>
+            <a:off x="6706232" y="3515729"/>
+            <a:ext cx="141526" cy="1105125"/>
           </a:xfrm>
           <a:prstGeom prst="line">
             <a:avLst/>
@@ -5040,7 +4962,7 @@
         <p:spPr>
           <a:xfrm flipH="1" flipV="1">
             <a:off x="5049067" y="4125105"/>
-            <a:ext cx="888156" cy="6741"/>
+            <a:ext cx="952684" cy="864768"/>
           </a:xfrm>
           <a:prstGeom prst="line">
             <a:avLst/>
@@ -5106,12 +5028,116 @@
           </a:p>
         </p:txBody>
       </p:sp>
-      <p:sp>
-        <p:nvSpPr>
-          <p:cNvPr id="114" name="ZoneTexte 113">
-            <a:extLst>
-              <a:ext uri="{FF2B5EF4-FFF2-40B4-BE49-F238E27FC236}">
-                <a16:creationId xmlns:a16="http://schemas.microsoft.com/office/drawing/2014/main" id="{3000F4C6-A384-41AA-9AB4-5BEC56DA5E6B}"/>
+      <p:grpSp>
+        <p:nvGrpSpPr>
+          <p:cNvPr id="12" name="Groupe 11">
+            <a:extLst>
+              <a:ext uri="{FF2B5EF4-FFF2-40B4-BE49-F238E27FC236}">
+                <a16:creationId xmlns:a16="http://schemas.microsoft.com/office/drawing/2014/main" id="{4531EFA8-CCA0-4F60-A708-2A63CC0E64D7}"/>
+              </a:ext>
+            </a:extLst>
+          </p:cNvPr>
+          <p:cNvGrpSpPr/>
+          <p:nvPr/>
+        </p:nvGrpSpPr>
+        <p:grpSpPr>
+          <a:xfrm>
+            <a:off x="8206654" y="4510874"/>
+            <a:ext cx="1408961" cy="738037"/>
+            <a:chOff x="8274467" y="3675888"/>
+            <a:chExt cx="1408961" cy="738037"/>
+          </a:xfrm>
+        </p:grpSpPr>
+        <p:sp>
+          <p:nvSpPr>
+            <p:cNvPr id="87" name="Ellipse 86">
+              <a:extLst>
+                <a:ext uri="{FF2B5EF4-FFF2-40B4-BE49-F238E27FC236}">
+                  <a16:creationId xmlns:a16="http://schemas.microsoft.com/office/drawing/2014/main" id="{F2BCCC1D-C1C3-44D9-90CE-183EAC1D3362}"/>
+                </a:ext>
+              </a:extLst>
+            </p:cNvPr>
+            <p:cNvSpPr/>
+            <p:nvPr/>
+          </p:nvSpPr>
+          <p:spPr>
+            <a:xfrm>
+              <a:off x="8274467" y="3675888"/>
+              <a:ext cx="1408961" cy="738037"/>
+            </a:xfrm>
+            <a:prstGeom prst="ellipse">
+              <a:avLst/>
+            </a:prstGeom>
+            <a:noFill/>
+          </p:spPr>
+          <p:style>
+            <a:lnRef idx="2">
+              <a:schemeClr val="accent1">
+                <a:shade val="50000"/>
+              </a:schemeClr>
+            </a:lnRef>
+            <a:fillRef idx="1">
+              <a:schemeClr val="accent1"/>
+            </a:fillRef>
+            <a:effectRef idx="0">
+              <a:schemeClr val="accent1"/>
+            </a:effectRef>
+            <a:fontRef idx="minor">
+              <a:schemeClr val="lt1"/>
+            </a:fontRef>
+          </p:style>
+          <p:txBody>
+            <a:bodyPr rtlCol="0" anchor="ctr"/>
+            <a:lstStyle/>
+            <a:p>
+              <a:pPr algn="ctr"/>
+              <a:endParaRPr lang="fr-FR"/>
+            </a:p>
+          </p:txBody>
+        </p:sp>
+        <p:sp>
+          <p:nvSpPr>
+            <p:cNvPr id="114" name="ZoneTexte 113">
+              <a:extLst>
+                <a:ext uri="{FF2B5EF4-FFF2-40B4-BE49-F238E27FC236}">
+                  <a16:creationId xmlns:a16="http://schemas.microsoft.com/office/drawing/2014/main" id="{3000F4C6-A384-41AA-9AB4-5BEC56DA5E6B}"/>
+                </a:ext>
+              </a:extLst>
+            </p:cNvPr>
+            <p:cNvSpPr txBox="1"/>
+            <p:nvPr/>
+          </p:nvSpPr>
+          <p:spPr>
+            <a:xfrm>
+              <a:off x="8444627" y="3864294"/>
+              <a:ext cx="1068642" cy="307777"/>
+            </a:xfrm>
+            <a:prstGeom prst="rect">
+              <a:avLst/>
+            </a:prstGeom>
+            <a:noFill/>
+          </p:spPr>
+          <p:txBody>
+            <a:bodyPr wrap="square" rtlCol="0">
+              <a:spAutoFit/>
+            </a:bodyPr>
+            <a:lstStyle/>
+            <a:p>
+              <a:pPr algn="ctr"/>
+              <a:r>
+                <a:rPr lang="fr-FR" sz="1400" b="1" dirty="0"/>
+                <a:t>Est un </a:t>
+              </a:r>
+            </a:p>
+          </p:txBody>
+        </p:sp>
+      </p:grpSp>
+      <p:sp>
+        <p:nvSpPr>
+          <p:cNvPr id="115" name="ZoneTexte 114">
+            <a:extLst>
+              <a:ext uri="{FF2B5EF4-FFF2-40B4-BE49-F238E27FC236}">
+                <a16:creationId xmlns:a16="http://schemas.microsoft.com/office/drawing/2014/main" id="{687F2265-42A9-4C7F-AA0D-1EC3CFC18B36}"/>
               </a:ext>
             </a:extLst>
           </p:cNvPr>
@@ -5120,8 +5146,8 @@
         </p:nvSpPr>
         <p:spPr>
           <a:xfrm>
-            <a:off x="8444627" y="3864294"/>
-            <a:ext cx="1068642" cy="307777"/>
+            <a:off x="8129748" y="3515736"/>
+            <a:ext cx="476412" cy="369332"/>
           </a:xfrm>
           <a:prstGeom prst="rect">
             <a:avLst/>
@@ -5129,25 +5155,128 @@
           <a:noFill/>
         </p:spPr>
         <p:txBody>
-          <a:bodyPr wrap="square" rtlCol="0">
+          <a:bodyPr wrap="none" rtlCol="0">
             <a:spAutoFit/>
           </a:bodyPr>
           <a:lstStyle/>
           <a:p>
-            <a:pPr algn="ctr"/>
-            <a:r>
-              <a:rPr lang="fr-FR" sz="1400" b="1" dirty="0"/>
-              <a:t>Est un </a:t>
-            </a:r>
-          </a:p>
-        </p:txBody>
-      </p:sp>
-      <p:sp>
-        <p:nvSpPr>
-          <p:cNvPr id="115" name="ZoneTexte 114">
-            <a:extLst>
-              <a:ext uri="{FF2B5EF4-FFF2-40B4-BE49-F238E27FC236}">
-                <a16:creationId xmlns:a16="http://schemas.microsoft.com/office/drawing/2014/main" id="{687F2265-42A9-4C7F-AA0D-1EC3CFC18B36}"/>
+            <a:r>
+              <a:rPr lang="fr-FR" dirty="0"/>
+              <a:t>0,1</a:t>
+            </a:r>
+          </a:p>
+        </p:txBody>
+      </p:sp>
+      <p:grpSp>
+        <p:nvGrpSpPr>
+          <p:cNvPr id="2" name="Groupe 1">
+            <a:extLst>
+              <a:ext uri="{FF2B5EF4-FFF2-40B4-BE49-F238E27FC236}">
+                <a16:creationId xmlns:a16="http://schemas.microsoft.com/office/drawing/2014/main" id="{C382DA7D-40D0-47BC-B0BC-04EE9D229245}"/>
+              </a:ext>
+            </a:extLst>
+          </p:cNvPr>
+          <p:cNvGrpSpPr/>
+          <p:nvPr/>
+        </p:nvGrpSpPr>
+        <p:grpSpPr>
+          <a:xfrm>
+            <a:off x="6001751" y="4620854"/>
+            <a:ext cx="1408961" cy="738037"/>
+            <a:chOff x="5937223" y="3762827"/>
+            <a:chExt cx="1408961" cy="738037"/>
+          </a:xfrm>
+        </p:grpSpPr>
+        <p:sp>
+          <p:nvSpPr>
+            <p:cNvPr id="101" name="Ellipse 100">
+              <a:extLst>
+                <a:ext uri="{FF2B5EF4-FFF2-40B4-BE49-F238E27FC236}">
+                  <a16:creationId xmlns:a16="http://schemas.microsoft.com/office/drawing/2014/main" id="{3E7CDB0D-8FCD-4D3F-9C64-9B6823A6A582}"/>
+                </a:ext>
+              </a:extLst>
+            </p:cNvPr>
+            <p:cNvSpPr/>
+            <p:nvPr/>
+          </p:nvSpPr>
+          <p:spPr>
+            <a:xfrm>
+              <a:off x="5937223" y="3762827"/>
+              <a:ext cx="1408961" cy="738037"/>
+            </a:xfrm>
+            <a:prstGeom prst="ellipse">
+              <a:avLst/>
+            </a:prstGeom>
+            <a:noFill/>
+          </p:spPr>
+          <p:style>
+            <a:lnRef idx="2">
+              <a:schemeClr val="accent1">
+                <a:shade val="50000"/>
+              </a:schemeClr>
+            </a:lnRef>
+            <a:fillRef idx="1">
+              <a:schemeClr val="accent1"/>
+            </a:fillRef>
+            <a:effectRef idx="0">
+              <a:schemeClr val="accent1"/>
+            </a:effectRef>
+            <a:fontRef idx="minor">
+              <a:schemeClr val="lt1"/>
+            </a:fontRef>
+          </p:style>
+          <p:txBody>
+            <a:bodyPr rtlCol="0" anchor="ctr"/>
+            <a:lstStyle/>
+            <a:p>
+              <a:pPr algn="ctr"/>
+              <a:endParaRPr lang="fr-FR"/>
+            </a:p>
+          </p:txBody>
+        </p:sp>
+        <p:sp>
+          <p:nvSpPr>
+            <p:cNvPr id="116" name="ZoneTexte 115">
+              <a:extLst>
+                <a:ext uri="{FF2B5EF4-FFF2-40B4-BE49-F238E27FC236}">
+                  <a16:creationId xmlns:a16="http://schemas.microsoft.com/office/drawing/2014/main" id="{BA729DC9-FCDC-44DA-AD93-DBDEA06CE226}"/>
+                </a:ext>
+              </a:extLst>
+            </p:cNvPr>
+            <p:cNvSpPr txBox="1"/>
+            <p:nvPr/>
+          </p:nvSpPr>
+          <p:spPr>
+            <a:xfrm>
+              <a:off x="6107382" y="3977956"/>
+              <a:ext cx="1068642" cy="307777"/>
+            </a:xfrm>
+            <a:prstGeom prst="rect">
+              <a:avLst/>
+            </a:prstGeom>
+            <a:noFill/>
+          </p:spPr>
+          <p:txBody>
+            <a:bodyPr wrap="square" rtlCol="0">
+              <a:spAutoFit/>
+            </a:bodyPr>
+            <a:lstStyle/>
+            <a:p>
+              <a:pPr algn="ctr"/>
+              <a:r>
+                <a:rPr lang="fr-FR" sz="1400" b="1" dirty="0"/>
+                <a:t>Participer </a:t>
+              </a:r>
+            </a:p>
+          </p:txBody>
+        </p:sp>
+      </p:grpSp>
+      <p:sp>
+        <p:nvSpPr>
+          <p:cNvPr id="118" name="ZoneTexte 117">
+            <a:extLst>
+              <a:ext uri="{FF2B5EF4-FFF2-40B4-BE49-F238E27FC236}">
+                <a16:creationId xmlns:a16="http://schemas.microsoft.com/office/drawing/2014/main" id="{0C191456-CFF5-48B7-88E3-B631A8BEFE36}"/>
               </a:ext>
             </a:extLst>
           </p:cNvPr>
@@ -5156,8 +5285,8 @@
         </p:nvSpPr>
         <p:spPr>
           <a:xfrm>
-            <a:off x="8123645" y="2946979"/>
-            <a:ext cx="476412" cy="369332"/>
+            <a:off x="5017369" y="4123920"/>
+            <a:ext cx="508473" cy="369332"/>
           </a:xfrm>
           <a:prstGeom prst="rect">
             <a:avLst/>
@@ -5172,17 +5301,17 @@
           <a:p>
             <a:r>
               <a:rPr lang="fr-FR" dirty="0"/>
-              <a:t>0,1</a:t>
-            </a:r>
-          </a:p>
-        </p:txBody>
-      </p:sp>
-      <p:sp>
-        <p:nvSpPr>
-          <p:cNvPr id="116" name="ZoneTexte 115">
-            <a:extLst>
-              <a:ext uri="{FF2B5EF4-FFF2-40B4-BE49-F238E27FC236}">
-                <a16:creationId xmlns:a16="http://schemas.microsoft.com/office/drawing/2014/main" id="{BA729DC9-FCDC-44DA-AD93-DBDEA06CE226}"/>
+              <a:t>0,N</a:t>
+            </a:r>
+          </a:p>
+        </p:txBody>
+      </p:sp>
+      <p:sp>
+        <p:nvSpPr>
+          <p:cNvPr id="119" name="ZoneTexte 118">
+            <a:extLst>
+              <a:ext uri="{FF2B5EF4-FFF2-40B4-BE49-F238E27FC236}">
+                <a16:creationId xmlns:a16="http://schemas.microsoft.com/office/drawing/2014/main" id="{A8D30285-CC6D-4C97-AEF2-4D26C3D619BB}"/>
               </a:ext>
             </a:extLst>
           </p:cNvPr>
@@ -5191,78 +5320,7 @@
         </p:nvSpPr>
         <p:spPr>
           <a:xfrm>
-            <a:off x="6107382" y="3977956"/>
-            <a:ext cx="1068642" cy="307777"/>
-          </a:xfrm>
-          <a:prstGeom prst="rect">
-            <a:avLst/>
-          </a:prstGeom>
-          <a:noFill/>
-        </p:spPr>
-        <p:txBody>
-          <a:bodyPr wrap="square" rtlCol="0">
-            <a:spAutoFit/>
-          </a:bodyPr>
-          <a:lstStyle/>
-          <a:p>
-            <a:pPr algn="ctr"/>
-            <a:r>
-              <a:rPr lang="fr-FR" sz="1400" b="1" dirty="0"/>
-              <a:t>Participer </a:t>
-            </a:r>
-          </a:p>
-        </p:txBody>
-      </p:sp>
-      <p:sp>
-        <p:nvSpPr>
-          <p:cNvPr id="118" name="ZoneTexte 117">
-            <a:extLst>
-              <a:ext uri="{FF2B5EF4-FFF2-40B4-BE49-F238E27FC236}">
-                <a16:creationId xmlns:a16="http://schemas.microsoft.com/office/drawing/2014/main" id="{0C191456-CFF5-48B7-88E3-B631A8BEFE36}"/>
-              </a:ext>
-            </a:extLst>
-          </p:cNvPr>
-          <p:cNvSpPr txBox="1"/>
-          <p:nvPr/>
-        </p:nvSpPr>
-        <p:spPr>
-          <a:xfrm>
-            <a:off x="5017369" y="4123920"/>
-            <a:ext cx="508473" cy="369332"/>
-          </a:xfrm>
-          <a:prstGeom prst="rect">
-            <a:avLst/>
-          </a:prstGeom>
-          <a:noFill/>
-        </p:spPr>
-        <p:txBody>
-          <a:bodyPr wrap="none" rtlCol="0">
-            <a:spAutoFit/>
-          </a:bodyPr>
-          <a:lstStyle/>
-          <a:p>
-            <a:r>
-              <a:rPr lang="fr-FR" dirty="0"/>
-              <a:t>0,N</a:t>
-            </a:r>
-          </a:p>
-        </p:txBody>
-      </p:sp>
-      <p:sp>
-        <p:nvSpPr>
-          <p:cNvPr id="119" name="ZoneTexte 118">
-            <a:extLst>
-              <a:ext uri="{FF2B5EF4-FFF2-40B4-BE49-F238E27FC236}">
-                <a16:creationId xmlns:a16="http://schemas.microsoft.com/office/drawing/2014/main" id="{A8D30285-CC6D-4C97-AEF2-4D26C3D619BB}"/>
-              </a:ext>
-            </a:extLst>
-          </p:cNvPr>
-          <p:cNvSpPr txBox="1"/>
-          <p:nvPr/>
-        </p:nvSpPr>
-        <p:spPr>
-          <a:xfrm>
-            <a:off x="6847758" y="2972940"/>
+            <a:off x="6832996" y="3603703"/>
             <a:ext cx="476412" cy="369332"/>
           </a:xfrm>
           <a:prstGeom prst="rect">

</xml_diff>

<commit_message>
ajout d'une colonne ds la page sondage en cours
</commit_message>
<xml_diff>
--- a/Documents/base de données.pptx
+++ b/Documents/base de données.pptx
@@ -260,7 +260,7 @@
           <a:p>
             <a:fld id="{A9D8FF9A-B495-4C1D-BB5F-1FB9EE86129C}" type="datetimeFigureOut">
               <a:rPr lang="fr-FR" smtClean="0"/>
-              <a:t>29/03/2020</a:t>
+              <a:t>31/03/2020</a:t>
             </a:fld>
             <a:endParaRPr lang="fr-FR"/>
           </a:p>
@@ -458,7 +458,7 @@
           <a:p>
             <a:fld id="{A9D8FF9A-B495-4C1D-BB5F-1FB9EE86129C}" type="datetimeFigureOut">
               <a:rPr lang="fr-FR" smtClean="0"/>
-              <a:t>29/03/2020</a:t>
+              <a:t>31/03/2020</a:t>
             </a:fld>
             <a:endParaRPr lang="fr-FR"/>
           </a:p>
@@ -666,7 +666,7 @@
           <a:p>
             <a:fld id="{A9D8FF9A-B495-4C1D-BB5F-1FB9EE86129C}" type="datetimeFigureOut">
               <a:rPr lang="fr-FR" smtClean="0"/>
-              <a:t>29/03/2020</a:t>
+              <a:t>31/03/2020</a:t>
             </a:fld>
             <a:endParaRPr lang="fr-FR"/>
           </a:p>
@@ -864,7 +864,7 @@
           <a:p>
             <a:fld id="{A9D8FF9A-B495-4C1D-BB5F-1FB9EE86129C}" type="datetimeFigureOut">
               <a:rPr lang="fr-FR" smtClean="0"/>
-              <a:t>29/03/2020</a:t>
+              <a:t>31/03/2020</a:t>
             </a:fld>
             <a:endParaRPr lang="fr-FR"/>
           </a:p>
@@ -1139,7 +1139,7 @@
           <a:p>
             <a:fld id="{A9D8FF9A-B495-4C1D-BB5F-1FB9EE86129C}" type="datetimeFigureOut">
               <a:rPr lang="fr-FR" smtClean="0"/>
-              <a:t>29/03/2020</a:t>
+              <a:t>31/03/2020</a:t>
             </a:fld>
             <a:endParaRPr lang="fr-FR"/>
           </a:p>
@@ -1404,7 +1404,7 @@
           <a:p>
             <a:fld id="{A9D8FF9A-B495-4C1D-BB5F-1FB9EE86129C}" type="datetimeFigureOut">
               <a:rPr lang="fr-FR" smtClean="0"/>
-              <a:t>29/03/2020</a:t>
+              <a:t>31/03/2020</a:t>
             </a:fld>
             <a:endParaRPr lang="fr-FR"/>
           </a:p>
@@ -1816,7 +1816,7 @@
           <a:p>
             <a:fld id="{A9D8FF9A-B495-4C1D-BB5F-1FB9EE86129C}" type="datetimeFigureOut">
               <a:rPr lang="fr-FR" smtClean="0"/>
-              <a:t>29/03/2020</a:t>
+              <a:t>31/03/2020</a:t>
             </a:fld>
             <a:endParaRPr lang="fr-FR"/>
           </a:p>
@@ -1957,7 +1957,7 @@
           <a:p>
             <a:fld id="{A9D8FF9A-B495-4C1D-BB5F-1FB9EE86129C}" type="datetimeFigureOut">
               <a:rPr lang="fr-FR" smtClean="0"/>
-              <a:t>29/03/2020</a:t>
+              <a:t>31/03/2020</a:t>
             </a:fld>
             <a:endParaRPr lang="fr-FR"/>
           </a:p>
@@ -2070,7 +2070,7 @@
           <a:p>
             <a:fld id="{A9D8FF9A-B495-4C1D-BB5F-1FB9EE86129C}" type="datetimeFigureOut">
               <a:rPr lang="fr-FR" smtClean="0"/>
-              <a:t>29/03/2020</a:t>
+              <a:t>31/03/2020</a:t>
             </a:fld>
             <a:endParaRPr lang="fr-FR"/>
           </a:p>
@@ -2381,7 +2381,7 @@
           <a:p>
             <a:fld id="{A9D8FF9A-B495-4C1D-BB5F-1FB9EE86129C}" type="datetimeFigureOut">
               <a:rPr lang="fr-FR" smtClean="0"/>
-              <a:t>29/03/2020</a:t>
+              <a:t>31/03/2020</a:t>
             </a:fld>
             <a:endParaRPr lang="fr-FR"/>
           </a:p>
@@ -2669,7 +2669,7 @@
           <a:p>
             <a:fld id="{A9D8FF9A-B495-4C1D-BB5F-1FB9EE86129C}" type="datetimeFigureOut">
               <a:rPr lang="fr-FR" smtClean="0"/>
-              <a:t>29/03/2020</a:t>
+              <a:t>31/03/2020</a:t>
             </a:fld>
             <a:endParaRPr lang="fr-FR"/>
           </a:p>
@@ -2910,7 +2910,7 @@
           <a:p>
             <a:fld id="{A9D8FF9A-B495-4C1D-BB5F-1FB9EE86129C}" type="datetimeFigureOut">
               <a:rPr lang="fr-FR" smtClean="0"/>
-              <a:t>29/03/2020</a:t>
+              <a:t>31/03/2020</a:t>
             </a:fld>
             <a:endParaRPr lang="fr-FR"/>
           </a:p>
@@ -3341,8 +3341,8 @@
         </p:nvSpPr>
         <p:spPr>
           <a:xfrm>
-            <a:off x="10000408" y="74018"/>
-            <a:ext cx="1879232" cy="2308324"/>
+            <a:off x="10220917" y="74018"/>
+            <a:ext cx="1438214" cy="2308324"/>
           </a:xfrm>
           <a:prstGeom prst="rect">
             <a:avLst/>
@@ -3370,7 +3370,7 @@
             <a:pPr algn="ctr"/>
             <a:r>
               <a:rPr lang="fr-FR" u="sng" dirty="0" err="1"/>
-              <a:t>NumUser</a:t>
+              <a:t>numUser</a:t>
             </a:r>
             <a:endParaRPr lang="fr-FR" u="sng" dirty="0"/>
           </a:p>
@@ -3378,42 +3378,43 @@
             <a:pPr algn="ctr"/>
             <a:r>
               <a:rPr lang="fr-FR" dirty="0"/>
-              <a:t>Nom</a:t>
+              <a:t>nom</a:t>
             </a:r>
           </a:p>
           <a:p>
             <a:pPr algn="ctr"/>
             <a:r>
               <a:rPr lang="fr-FR" dirty="0"/>
-              <a:t>Prénom</a:t>
+              <a:t>prénom</a:t>
             </a:r>
           </a:p>
           <a:p>
             <a:pPr algn="ctr"/>
             <a:r>
               <a:rPr lang="fr-FR" dirty="0"/>
-              <a:t>Email</a:t>
+              <a:t>email</a:t>
             </a:r>
           </a:p>
           <a:p>
             <a:pPr algn="ctr"/>
             <a:r>
               <a:rPr lang="fr-FR" dirty="0"/>
-              <a:t>Mot de passe</a:t>
-            </a:r>
+              <a:t>photo</a:t>
+            </a:r>
+          </a:p>
+          <a:p>
+            <a:pPr algn="ctr"/>
+            <a:r>
+              <a:rPr lang="fr-FR" dirty="0" err="1"/>
+              <a:t>thumbnail</a:t>
+            </a:r>
+            <a:endParaRPr lang="fr-FR" dirty="0"/>
           </a:p>
           <a:p>
             <a:pPr algn="ctr"/>
             <a:r>
               <a:rPr lang="fr-FR" dirty="0"/>
-              <a:t>Date de naissance</a:t>
-            </a:r>
-          </a:p>
-          <a:p>
-            <a:pPr algn="ctr"/>
-            <a:r>
-              <a:rPr lang="fr-FR" dirty="0"/>
-              <a:t>Genre</a:t>
+              <a:t>mot de passe</a:t>
             </a:r>
           </a:p>
         </p:txBody>
@@ -3433,7 +3434,7 @@
         <p:spPr>
           <a:xfrm>
             <a:off x="3701198" y="3663440"/>
-            <a:ext cx="1347869" cy="923330"/>
+            <a:ext cx="1347869" cy="1477328"/>
           </a:xfrm>
           <a:prstGeom prst="rect">
             <a:avLst/>
@@ -3461,7 +3462,7 @@
             <a:pPr algn="ctr"/>
             <a:r>
               <a:rPr lang="fr-FR" u="sng" dirty="0" err="1"/>
-              <a:t>NumEvent</a:t>
+              <a:t>numEvent</a:t>
             </a:r>
             <a:endParaRPr lang="fr-FR" u="sng" dirty="0"/>
           </a:p>
@@ -3469,8 +3470,23 @@
             <a:pPr algn="ctr"/>
             <a:r>
               <a:rPr lang="fr-FR" dirty="0"/>
-              <a:t>Nom</a:t>
-            </a:r>
+              <a:t>Titre</a:t>
+            </a:r>
+          </a:p>
+          <a:p>
+            <a:pPr algn="ctr"/>
+            <a:r>
+              <a:rPr lang="fr-FR" dirty="0"/>
+              <a:t>Lieu</a:t>
+            </a:r>
+          </a:p>
+          <a:p>
+            <a:pPr algn="ctr"/>
+            <a:r>
+              <a:rPr lang="fr-FR" dirty="0" err="1"/>
+              <a:t>descri</a:t>
+            </a:r>
+            <a:endParaRPr lang="fr-FR" dirty="0"/>
           </a:p>
         </p:txBody>
       </p:sp>
@@ -3488,8 +3504,8 @@
         </p:nvSpPr>
         <p:spPr>
           <a:xfrm>
-            <a:off x="10284777" y="5500855"/>
-            <a:ext cx="1343125" cy="923330"/>
+            <a:off x="10298403" y="5500855"/>
+            <a:ext cx="1315874" cy="923330"/>
           </a:xfrm>
           <a:prstGeom prst="rect">
             <a:avLst/>
@@ -3517,7 +3533,7 @@
             <a:pPr algn="ctr"/>
             <a:r>
               <a:rPr lang="fr-FR" u="sng" dirty="0" err="1"/>
-              <a:t>NumGroupe</a:t>
+              <a:t>numGroupe</a:t>
             </a:r>
             <a:endParaRPr lang="fr-FR" u="sng" dirty="0"/>
           </a:p>
@@ -3544,8 +3560,8 @@
         </p:nvSpPr>
         <p:spPr>
           <a:xfrm>
-            <a:off x="934287" y="5358891"/>
-            <a:ext cx="1269386" cy="1200329"/>
+            <a:off x="844212" y="5632397"/>
+            <a:ext cx="1269385" cy="923330"/>
           </a:xfrm>
           <a:prstGeom prst="rect">
             <a:avLst/>
@@ -3573,23 +3589,17 @@
             <a:pPr algn="ctr"/>
             <a:r>
               <a:rPr lang="fr-FR" u="sng" dirty="0" err="1"/>
-              <a:t>NumDoc</a:t>
+              <a:t>nomDoc</a:t>
             </a:r>
             <a:endParaRPr lang="fr-FR" u="sng" dirty="0"/>
           </a:p>
           <a:p>
             <a:pPr algn="ctr"/>
             <a:r>
-              <a:rPr lang="fr-FR" dirty="0"/>
-              <a:t>Nom</a:t>
-            </a:r>
-          </a:p>
-          <a:p>
-            <a:pPr algn="ctr"/>
-            <a:r>
-              <a:rPr lang="fr-FR" dirty="0"/>
-              <a:t>Type?</a:t>
-            </a:r>
+              <a:rPr lang="fr-FR" u="sng" dirty="0" err="1"/>
+              <a:t>numEvent</a:t>
+            </a:r>
+            <a:endParaRPr lang="fr-FR" u="sng" dirty="0"/>
           </a:p>
         </p:txBody>
       </p:sp>
@@ -3607,8 +3617,8 @@
         </p:nvSpPr>
         <p:spPr>
           <a:xfrm>
-            <a:off x="10386744" y="3948543"/>
-            <a:ext cx="1220592" cy="646331"/>
+            <a:off x="10345035" y="3948543"/>
+            <a:ext cx="1304011" cy="646331"/>
           </a:xfrm>
           <a:prstGeom prst="rect">
             <a:avLst/>
@@ -3635,7 +3645,7 @@
             <a:pPr algn="ctr"/>
             <a:r>
               <a:rPr lang="fr-FR" dirty="0"/>
-              <a:t>Statut</a:t>
+              <a:t>propriétaire</a:t>
             </a:r>
           </a:p>
         </p:txBody>
@@ -3921,7 +3931,7 @@
         <p:spPr>
           <a:xfrm>
             <a:off x="1597244" y="2229224"/>
-            <a:ext cx="2103954" cy="1895881"/>
+            <a:ext cx="2103954" cy="2172880"/>
           </a:xfrm>
           <a:prstGeom prst="line">
             <a:avLst/>
@@ -4000,8 +4010,8 @@
         </p:nvCxnSpPr>
         <p:spPr>
           <a:xfrm>
-            <a:off x="4375133" y="4586770"/>
-            <a:ext cx="0" cy="1014395"/>
+            <a:off x="4375133" y="5140768"/>
+            <a:ext cx="0" cy="460397"/>
           </a:xfrm>
           <a:prstGeom prst="line">
             <a:avLst/>
@@ -4039,9 +4049,9 @@
           <p:nvPr/>
         </p:nvCxnSpPr>
         <p:spPr>
-          <a:xfrm>
-            <a:off x="2203673" y="5959056"/>
-            <a:ext cx="1165155" cy="217"/>
+          <a:xfrm flipV="1">
+            <a:off x="2113597" y="5959273"/>
+            <a:ext cx="1255231" cy="134789"/>
           </a:xfrm>
           <a:prstGeom prst="line">
             <a:avLst/>
@@ -4191,7 +4201,7 @@
         </p:nvSpPr>
         <p:spPr>
           <a:xfrm>
-            <a:off x="3233180" y="4135702"/>
+            <a:off x="3209521" y="4344946"/>
             <a:ext cx="476412" cy="369332"/>
           </a:xfrm>
           <a:prstGeom prst="rect">
@@ -4242,7 +4252,7 @@
           <a:p>
             <a:r>
               <a:rPr lang="fr-FR" dirty="0"/>
-              <a:t>0,N</a:t>
+              <a:t>0,1</a:t>
             </a:r>
           </a:p>
         </p:txBody>
@@ -4261,7 +4271,7 @@
         </p:nvSpPr>
         <p:spPr>
           <a:xfrm>
-            <a:off x="3955275" y="4582966"/>
+            <a:off x="3908275" y="5106277"/>
             <a:ext cx="508473" cy="369332"/>
           </a:xfrm>
           <a:prstGeom prst="rect">
@@ -4583,7 +4593,7 @@
             <a:pPr algn="ctr"/>
             <a:r>
               <a:rPr lang="fr-FR" dirty="0"/>
-              <a:t>Statut</a:t>
+              <a:t>statut</a:t>
             </a:r>
           </a:p>
           <a:p>
@@ -4598,7 +4608,7 @@
             <a:pPr algn="ctr"/>
             <a:r>
               <a:rPr lang="fr-FR" dirty="0"/>
-              <a:t>Participation</a:t>
+              <a:t>participation</a:t>
             </a:r>
           </a:p>
           <a:p>
@@ -4883,7 +4893,7 @@
         <p:spPr>
           <a:xfrm flipV="1">
             <a:off x="8911135" y="1228180"/>
-            <a:ext cx="1089273" cy="3282694"/>
+            <a:ext cx="1309782" cy="3282694"/>
           </a:xfrm>
           <a:prstGeom prst="line">
             <a:avLst/>
@@ -4961,8 +4971,8 @@
         </p:nvCxnSpPr>
         <p:spPr>
           <a:xfrm flipH="1" flipV="1">
-            <a:off x="5049067" y="4125105"/>
-            <a:ext cx="952684" cy="864768"/>
+            <a:off x="5049067" y="4402104"/>
+            <a:ext cx="952684" cy="587769"/>
           </a:xfrm>
           <a:prstGeom prst="line">
             <a:avLst/>
@@ -5604,7 +5614,7 @@
         <p:spPr>
           <a:xfrm flipV="1">
             <a:off x="8087629" y="5962520"/>
-            <a:ext cx="2197148" cy="137990"/>
+            <a:ext cx="2210774" cy="137990"/>
           </a:xfrm>
           <a:prstGeom prst="line">
             <a:avLst/>
@@ -5642,8 +5652,8 @@
         </p:nvCxnSpPr>
         <p:spPr>
           <a:xfrm>
-            <a:off x="5049067" y="4576543"/>
-            <a:ext cx="1612047" cy="1532910"/>
+            <a:off x="5046697" y="5148459"/>
+            <a:ext cx="1614417" cy="960994"/>
           </a:xfrm>
           <a:prstGeom prst="line">
             <a:avLst/>
@@ -5678,7 +5688,7 @@
         </p:nvSpPr>
         <p:spPr>
           <a:xfrm>
-            <a:off x="4684622" y="4578805"/>
+            <a:off x="5059707" y="4873966"/>
             <a:ext cx="508473" cy="369332"/>
           </a:xfrm>
           <a:prstGeom prst="rect">

</xml_diff>